<commit_message>
Adicao de firula nos dados da turma
Adicao de firula nos dados da turma
</commit_message>
<xml_diff>
--- a/Documentos-Engenharia/FIAP-QualidProjSW-Aula-1-Introducao Qualidade - EXERCICIOS.pptx
+++ b/Documentos-Engenharia/FIAP-QualidProjSW-Aula-1-Introducao Qualidade - EXERCICIOS.pptx
@@ -5104,12 +5104,11 @@
               <a:rPr lang="it-IT" b="1" dirty="0"/>
               <a:t>QUALIDADE DE SOFTWARE E GOVERNANÇA DE TI</a:t>
             </a:r>
-            <a:endParaRPr lang="pt-BR" b="1" dirty="0"/>
-          </a:p>
-          <a:p>
-            <a:r>
-              <a:rPr lang="pt-BR" b="1"/>
-              <a:t>TURMA 3SI</a:t>
+          </a:p>
+          <a:p>
+            <a:r>
+              <a:rPr lang="it-IT" b="1"/>
+              <a:t>3SI.*****</a:t>
             </a:r>
             <a:endParaRPr lang="pt-BR" b="1" dirty="0"/>
           </a:p>

</xml_diff>